<commit_message>
added data to components MyPosts, Dialogs
</commit_message>
<xml_diff>
--- a/nesting map.pptx
+++ b/nesting map.pptx
@@ -244,7 +244,7 @@
           <a:p>
             <a:fld id="{AB06D249-89D2-4D72-AFFF-CBF7E082558F}" type="datetimeFigureOut">
               <a:rPr lang="ru-RU" smtClean="0"/>
-              <a:t>27.07.2022</a:t>
+              <a:t>31.07.2022</a:t>
             </a:fld>
             <a:endParaRPr lang="ru-RU"/>
           </a:p>
@@ -414,7 +414,7 @@
           <a:p>
             <a:fld id="{AB06D249-89D2-4D72-AFFF-CBF7E082558F}" type="datetimeFigureOut">
               <a:rPr lang="ru-RU" smtClean="0"/>
-              <a:t>27.07.2022</a:t>
+              <a:t>31.07.2022</a:t>
             </a:fld>
             <a:endParaRPr lang="ru-RU"/>
           </a:p>
@@ -594,7 +594,7 @@
           <a:p>
             <a:fld id="{AB06D249-89D2-4D72-AFFF-CBF7E082558F}" type="datetimeFigureOut">
               <a:rPr lang="ru-RU" smtClean="0"/>
-              <a:t>27.07.2022</a:t>
+              <a:t>31.07.2022</a:t>
             </a:fld>
             <a:endParaRPr lang="ru-RU"/>
           </a:p>
@@ -764,7 +764,7 @@
           <a:p>
             <a:fld id="{AB06D249-89D2-4D72-AFFF-CBF7E082558F}" type="datetimeFigureOut">
               <a:rPr lang="ru-RU" smtClean="0"/>
-              <a:t>27.07.2022</a:t>
+              <a:t>31.07.2022</a:t>
             </a:fld>
             <a:endParaRPr lang="ru-RU"/>
           </a:p>
@@ -1010,7 +1010,7 @@
           <a:p>
             <a:fld id="{AB06D249-89D2-4D72-AFFF-CBF7E082558F}" type="datetimeFigureOut">
               <a:rPr lang="ru-RU" smtClean="0"/>
-              <a:t>27.07.2022</a:t>
+              <a:t>31.07.2022</a:t>
             </a:fld>
             <a:endParaRPr lang="ru-RU"/>
           </a:p>
@@ -1242,7 +1242,7 @@
           <a:p>
             <a:fld id="{AB06D249-89D2-4D72-AFFF-CBF7E082558F}" type="datetimeFigureOut">
               <a:rPr lang="ru-RU" smtClean="0"/>
-              <a:t>27.07.2022</a:t>
+              <a:t>31.07.2022</a:t>
             </a:fld>
             <a:endParaRPr lang="ru-RU"/>
           </a:p>
@@ -1609,7 +1609,7 @@
           <a:p>
             <a:fld id="{AB06D249-89D2-4D72-AFFF-CBF7E082558F}" type="datetimeFigureOut">
               <a:rPr lang="ru-RU" smtClean="0"/>
-              <a:t>27.07.2022</a:t>
+              <a:t>31.07.2022</a:t>
             </a:fld>
             <a:endParaRPr lang="ru-RU"/>
           </a:p>
@@ -1727,7 +1727,7 @@
           <a:p>
             <a:fld id="{AB06D249-89D2-4D72-AFFF-CBF7E082558F}" type="datetimeFigureOut">
               <a:rPr lang="ru-RU" smtClean="0"/>
-              <a:t>27.07.2022</a:t>
+              <a:t>31.07.2022</a:t>
             </a:fld>
             <a:endParaRPr lang="ru-RU"/>
           </a:p>
@@ -1822,7 +1822,7 @@
           <a:p>
             <a:fld id="{AB06D249-89D2-4D72-AFFF-CBF7E082558F}" type="datetimeFigureOut">
               <a:rPr lang="ru-RU" smtClean="0"/>
-              <a:t>27.07.2022</a:t>
+              <a:t>31.07.2022</a:t>
             </a:fld>
             <a:endParaRPr lang="ru-RU"/>
           </a:p>
@@ -2099,7 +2099,7 @@
           <a:p>
             <a:fld id="{AB06D249-89D2-4D72-AFFF-CBF7E082558F}" type="datetimeFigureOut">
               <a:rPr lang="ru-RU" smtClean="0"/>
-              <a:t>27.07.2022</a:t>
+              <a:t>31.07.2022</a:t>
             </a:fld>
             <a:endParaRPr lang="ru-RU"/>
           </a:p>
@@ -2352,7 +2352,7 @@
           <a:p>
             <a:fld id="{AB06D249-89D2-4D72-AFFF-CBF7E082558F}" type="datetimeFigureOut">
               <a:rPr lang="ru-RU" smtClean="0"/>
-              <a:t>27.07.2022</a:t>
+              <a:t>31.07.2022</a:t>
             </a:fld>
             <a:endParaRPr lang="ru-RU"/>
           </a:p>
@@ -2565,7 +2565,7 @@
           <a:p>
             <a:fld id="{AB06D249-89D2-4D72-AFFF-CBF7E082558F}" type="datetimeFigureOut">
               <a:rPr lang="ru-RU" smtClean="0"/>
-              <a:t>27.07.2022</a:t>
+              <a:t>31.07.2022</a:t>
             </a:fld>
             <a:endParaRPr lang="ru-RU"/>
           </a:p>
@@ -2979,7 +2979,7 @@
         <p:spPr>
           <a:xfrm>
             <a:off x="3003034" y="279952"/>
-            <a:ext cx="1219200" cy="378691"/>
+            <a:ext cx="903948" cy="378691"/>
           </a:xfrm>
           <a:prstGeom prst="rect">
             <a:avLst/>
@@ -3023,7 +3023,7 @@
         <p:spPr>
           <a:xfrm>
             <a:off x="4836160" y="279952"/>
-            <a:ext cx="853440" cy="378691"/>
+            <a:ext cx="788785" cy="378691"/>
           </a:xfrm>
           <a:prstGeom prst="rect">
             <a:avLst/>
@@ -3065,8 +3065,8 @@
         </p:nvSpPr>
         <p:spPr>
           <a:xfrm>
-            <a:off x="855427" y="1200035"/>
-            <a:ext cx="1219200" cy="375920"/>
+            <a:off x="402845" y="1208577"/>
+            <a:ext cx="917955" cy="375920"/>
           </a:xfrm>
           <a:prstGeom prst="rect">
             <a:avLst/>
@@ -3094,8 +3094,8 @@
           <a:p>
             <a:pPr algn="ctr"/>
             <a:r>
-              <a:rPr lang="en-US" dirty="0" err="1" smtClean="0"/>
-              <a:t>Header.jsx</a:t>
+              <a:rPr lang="en-US" dirty="0" smtClean="0"/>
+              <a:t>Header</a:t>
             </a:r>
             <a:endParaRPr lang="ru-RU" dirty="0"/>
           </a:p>
@@ -3105,19 +3105,19 @@
         <p:nvCxnSpPr>
           <p:cNvPr id="16" name="Соединительная линия уступом 15"/>
           <p:cNvCxnSpPr>
-            <a:stCxn id="8" idx="1"/>
-            <a:endCxn id="12" idx="3"/>
+            <a:stCxn id="8" idx="2"/>
+            <a:endCxn id="12" idx="0"/>
           </p:cNvCxnSpPr>
           <p:nvPr/>
         </p:nvCxnSpPr>
         <p:spPr>
-          <a:xfrm rot="10800000" flipV="1">
-            <a:off x="2074628" y="469297"/>
-            <a:ext cx="2761533" cy="918697"/>
+          <a:xfrm rot="5400000">
+            <a:off x="2771221" y="-1250755"/>
+            <a:ext cx="549934" cy="4368730"/>
           </a:xfrm>
           <a:prstGeom prst="bentConnector3">
             <a:avLst>
-              <a:gd name="adj1" fmla="val 18226"/>
+              <a:gd name="adj1" fmla="val 50000"/>
             </a:avLst>
           </a:prstGeom>
           <a:ln>
@@ -3147,8 +3147,8 @@
         </p:nvSpPr>
         <p:spPr>
           <a:xfrm>
-            <a:off x="4676518" y="1173480"/>
-            <a:ext cx="1172726" cy="386080"/>
+            <a:off x="4793883" y="1242915"/>
+            <a:ext cx="873337" cy="386080"/>
           </a:xfrm>
           <a:prstGeom prst="rect">
             <a:avLst/>
@@ -3177,7 +3177,7 @@
             <a:pPr algn="ctr"/>
             <a:r>
               <a:rPr lang="en-US" dirty="0" err="1" smtClean="0"/>
-              <a:t>Navbar.jsx</a:t>
+              <a:t>Navbar</a:t>
             </a:r>
             <a:endParaRPr lang="ru-RU" dirty="0"/>
           </a:p>
@@ -3186,13 +3186,16 @@
       <p:cxnSp>
         <p:nvCxnSpPr>
           <p:cNvPr id="26" name="Прямая со стрелкой 25"/>
-          <p:cNvCxnSpPr/>
+          <p:cNvCxnSpPr>
+            <a:stCxn id="8" idx="2"/>
+            <a:endCxn id="18" idx="0"/>
+          </p:cNvCxnSpPr>
           <p:nvPr/>
         </p:nvCxnSpPr>
         <p:spPr>
-          <a:xfrm>
-            <a:off x="5238207" y="658643"/>
-            <a:ext cx="1" cy="514837"/>
+          <a:xfrm flipH="1">
+            <a:off x="5230552" y="658643"/>
+            <a:ext cx="1" cy="584272"/>
           </a:xfrm>
           <a:prstGeom prst="straightConnector1">
             <a:avLst/>
@@ -3224,8 +3227,8 @@
         </p:nvSpPr>
         <p:spPr>
           <a:xfrm>
-            <a:off x="8456230" y="1173480"/>
-            <a:ext cx="1351280" cy="391160"/>
+            <a:off x="10030328" y="1192414"/>
+            <a:ext cx="881734" cy="391160"/>
           </a:xfrm>
           <a:prstGeom prst="rect">
             <a:avLst/>
@@ -3253,8 +3256,8 @@
           <a:p>
             <a:pPr algn="ctr"/>
             <a:r>
-              <a:rPr lang="en-US" dirty="0" err="1" smtClean="0"/>
-              <a:t>Profile.jsx</a:t>
+              <a:rPr lang="en-US" dirty="0" smtClean="0"/>
+              <a:t>Profile</a:t>
             </a:r>
             <a:endParaRPr lang="en-US" dirty="0" smtClean="0"/>
           </a:p>
@@ -3264,14 +3267,15 @@
         <p:nvCxnSpPr>
           <p:cNvPr id="34" name="Соединительная линия уступом 33"/>
           <p:cNvCxnSpPr>
+            <a:stCxn id="8" idx="3"/>
             <a:endCxn id="28" idx="0"/>
           </p:cNvCxnSpPr>
           <p:nvPr/>
         </p:nvCxnSpPr>
         <p:spPr>
           <a:xfrm>
-            <a:off x="5689600" y="464679"/>
-            <a:ext cx="3442270" cy="708801"/>
+            <a:off x="5624945" y="469298"/>
+            <a:ext cx="4846250" cy="723116"/>
           </a:xfrm>
           <a:prstGeom prst="bentConnector2">
             <a:avLst/>
@@ -3306,8 +3310,8 @@
         </p:nvCxnSpPr>
         <p:spPr>
           <a:xfrm rot="5400000" flipH="1" flipV="1">
-            <a:off x="4437757" y="-545171"/>
-            <a:ext cx="12700" cy="1650246"/>
+            <a:off x="4342780" y="-607820"/>
+            <a:ext cx="12700" cy="1775545"/>
           </a:xfrm>
           <a:prstGeom prst="bentConnector3">
             <a:avLst>
@@ -3341,8 +3345,8 @@
         </p:nvSpPr>
         <p:spPr>
           <a:xfrm>
-            <a:off x="8456230" y="2022763"/>
-            <a:ext cx="1351280" cy="341746"/>
+            <a:off x="9035972" y="1871105"/>
+            <a:ext cx="994356" cy="341746"/>
           </a:xfrm>
           <a:prstGeom prst="rect">
             <a:avLst/>
@@ -3371,48 +3375,12 @@
             <a:pPr algn="ctr"/>
             <a:r>
               <a:rPr lang="en-US" dirty="0" err="1" smtClean="0"/>
-              <a:t>MyPosts.jsx</a:t>
+              <a:t>MyPosts</a:t>
             </a:r>
             <a:endParaRPr lang="ru-RU" dirty="0"/>
           </a:p>
         </p:txBody>
       </p:sp>
-      <p:cxnSp>
-        <p:nvCxnSpPr>
-          <p:cNvPr id="35" name="Прямая со стрелкой 34"/>
-          <p:cNvCxnSpPr>
-            <a:stCxn id="28" idx="2"/>
-            <a:endCxn id="32" idx="0"/>
-          </p:cNvCxnSpPr>
-          <p:nvPr/>
-        </p:nvCxnSpPr>
-        <p:spPr>
-          <a:xfrm>
-            <a:off x="9131870" y="1564640"/>
-            <a:ext cx="0" cy="458123"/>
-          </a:xfrm>
-          <a:prstGeom prst="straightConnector1">
-            <a:avLst/>
-          </a:prstGeom>
-          <a:ln>
-            <a:tailEnd type="triangle"/>
-          </a:ln>
-        </p:spPr>
-        <p:style>
-          <a:lnRef idx="3">
-            <a:schemeClr val="accent6"/>
-          </a:lnRef>
-          <a:fillRef idx="0">
-            <a:schemeClr val="accent6"/>
-          </a:fillRef>
-          <a:effectRef idx="2">
-            <a:schemeClr val="accent6"/>
-          </a:effectRef>
-          <a:fontRef idx="minor">
-            <a:schemeClr val="tx1"/>
-          </a:fontRef>
-        </p:style>
-      </p:cxnSp>
       <p:sp>
         <p:nvSpPr>
           <p:cNvPr id="36" name="Прямоугольник 35"/>
@@ -3421,8 +3389,8 @@
         </p:nvSpPr>
         <p:spPr>
           <a:xfrm>
-            <a:off x="8627041" y="2642522"/>
-            <a:ext cx="1009657" cy="360219"/>
+            <a:off x="9229935" y="2531323"/>
+            <a:ext cx="606429" cy="360219"/>
           </a:xfrm>
           <a:prstGeom prst="rect">
             <a:avLst/>
@@ -3450,8 +3418,8 @@
           <a:p>
             <a:pPr algn="ctr"/>
             <a:r>
-              <a:rPr lang="en-US" dirty="0" err="1" smtClean="0"/>
-              <a:t>Post.jsx</a:t>
+              <a:rPr lang="en-US" dirty="0" smtClean="0"/>
+              <a:t>Post</a:t>
             </a:r>
             <a:endParaRPr lang="ru-RU" dirty="0"/>
           </a:p>
@@ -3468,10 +3436,206 @@
         </p:nvCxnSpPr>
         <p:spPr>
           <a:xfrm>
-            <a:off x="9131870" y="2364509"/>
-            <a:ext cx="0" cy="278013"/>
+            <a:off x="9533150" y="2212851"/>
+            <a:ext cx="0" cy="318472"/>
           </a:xfrm>
           <a:prstGeom prst="straightConnector1">
+            <a:avLst/>
+          </a:prstGeom>
+          <a:ln>
+            <a:tailEnd type="triangle"/>
+          </a:ln>
+        </p:spPr>
+        <p:style>
+          <a:lnRef idx="3">
+            <a:schemeClr val="accent6"/>
+          </a:lnRef>
+          <a:fillRef idx="0">
+            <a:schemeClr val="accent6"/>
+          </a:fillRef>
+          <a:effectRef idx="2">
+            <a:schemeClr val="accent6"/>
+          </a:effectRef>
+          <a:fontRef idx="minor">
+            <a:schemeClr val="tx1"/>
+          </a:fontRef>
+        </p:style>
+      </p:cxnSp>
+      <p:cxnSp>
+        <p:nvCxnSpPr>
+          <p:cNvPr id="7" name="Соединительная линия уступом 6"/>
+          <p:cNvCxnSpPr>
+            <a:stCxn id="28" idx="1"/>
+            <a:endCxn id="32" idx="0"/>
+          </p:cNvCxnSpPr>
+          <p:nvPr/>
+        </p:nvCxnSpPr>
+        <p:spPr>
+          <a:xfrm rot="10800000" flipV="1">
+            <a:off x="9533150" y="1387993"/>
+            <a:ext cx="497178" cy="483111"/>
+          </a:xfrm>
+          <a:prstGeom prst="bentConnector2">
+            <a:avLst/>
+          </a:prstGeom>
+          <a:ln>
+            <a:tailEnd type="triangle"/>
+          </a:ln>
+        </p:spPr>
+        <p:style>
+          <a:lnRef idx="3">
+            <a:schemeClr val="accent6"/>
+          </a:lnRef>
+          <a:fillRef idx="0">
+            <a:schemeClr val="accent6"/>
+          </a:fillRef>
+          <a:effectRef idx="2">
+            <a:schemeClr val="accent6"/>
+          </a:effectRef>
+          <a:fontRef idx="minor">
+            <a:schemeClr val="tx1"/>
+          </a:fontRef>
+        </p:style>
+      </p:cxnSp>
+      <p:sp>
+        <p:nvSpPr>
+          <p:cNvPr id="11" name="Прямоугольник 10"/>
+          <p:cNvSpPr/>
+          <p:nvPr/>
+        </p:nvSpPr>
+        <p:spPr>
+          <a:xfrm>
+            <a:off x="10912062" y="1882280"/>
+            <a:ext cx="1163782" cy="341747"/>
+          </a:xfrm>
+          <a:prstGeom prst="rect">
+            <a:avLst/>
+          </a:prstGeom>
+        </p:spPr>
+        <p:style>
+          <a:lnRef idx="2">
+            <a:schemeClr val="accent1">
+              <a:shade val="50000"/>
+            </a:schemeClr>
+          </a:lnRef>
+          <a:fillRef idx="1">
+            <a:schemeClr val="accent1"/>
+          </a:fillRef>
+          <a:effectRef idx="0">
+            <a:schemeClr val="accent1"/>
+          </a:effectRef>
+          <a:fontRef idx="minor">
+            <a:schemeClr val="lt1"/>
+          </a:fontRef>
+        </p:style>
+        <p:txBody>
+          <a:bodyPr rtlCol="0" anchor="ctr"/>
+          <a:lstStyle/>
+          <a:p>
+            <a:pPr algn="ctr"/>
+            <a:r>
+              <a:rPr lang="en-US" dirty="0" err="1" smtClean="0"/>
+              <a:t>ProfileInfo</a:t>
+            </a:r>
+            <a:endParaRPr lang="en-US" dirty="0"/>
+          </a:p>
+        </p:txBody>
+      </p:sp>
+      <p:cxnSp>
+        <p:nvCxnSpPr>
+          <p:cNvPr id="14" name="Соединительная линия уступом 13"/>
+          <p:cNvCxnSpPr>
+            <a:stCxn id="28" idx="3"/>
+            <a:endCxn id="11" idx="0"/>
+          </p:cNvCxnSpPr>
+          <p:nvPr/>
+        </p:nvCxnSpPr>
+        <p:spPr>
+          <a:xfrm>
+            <a:off x="10912062" y="1387994"/>
+            <a:ext cx="581891" cy="494286"/>
+          </a:xfrm>
+          <a:prstGeom prst="bentConnector2">
+            <a:avLst/>
+          </a:prstGeom>
+          <a:ln>
+            <a:tailEnd type="triangle"/>
+          </a:ln>
+        </p:spPr>
+        <p:style>
+          <a:lnRef idx="3">
+            <a:schemeClr val="accent6"/>
+          </a:lnRef>
+          <a:fillRef idx="0">
+            <a:schemeClr val="accent6"/>
+          </a:fillRef>
+          <a:effectRef idx="2">
+            <a:schemeClr val="accent6"/>
+          </a:effectRef>
+          <a:fontRef idx="minor">
+            <a:schemeClr val="tx1"/>
+          </a:fontRef>
+        </p:style>
+      </p:cxnSp>
+      <p:sp>
+        <p:nvSpPr>
+          <p:cNvPr id="56" name="Прямоугольник 55"/>
+          <p:cNvSpPr/>
+          <p:nvPr/>
+        </p:nvSpPr>
+        <p:spPr>
+          <a:xfrm>
+            <a:off x="6915289" y="1198648"/>
+            <a:ext cx="861730" cy="378691"/>
+          </a:xfrm>
+          <a:prstGeom prst="rect">
+            <a:avLst/>
+          </a:prstGeom>
+        </p:spPr>
+        <p:style>
+          <a:lnRef idx="2">
+            <a:schemeClr val="accent1">
+              <a:shade val="50000"/>
+            </a:schemeClr>
+          </a:lnRef>
+          <a:fillRef idx="1">
+            <a:schemeClr val="accent1"/>
+          </a:fillRef>
+          <a:effectRef idx="0">
+            <a:schemeClr val="accent1"/>
+          </a:effectRef>
+          <a:fontRef idx="minor">
+            <a:schemeClr val="lt1"/>
+          </a:fontRef>
+        </p:style>
+        <p:txBody>
+          <a:bodyPr rtlCol="0" anchor="ctr"/>
+          <a:lstStyle/>
+          <a:p>
+            <a:pPr algn="ctr"/>
+            <a:r>
+              <a:rPr lang="en-US" dirty="0" smtClean="0"/>
+              <a:t>Dialogs</a:t>
+            </a:r>
+            <a:endParaRPr lang="ru-RU" dirty="0"/>
+          </a:p>
+        </p:txBody>
+      </p:sp>
+      <p:cxnSp>
+        <p:nvCxnSpPr>
+          <p:cNvPr id="58" name="Соединительная линия уступом 57"/>
+          <p:cNvCxnSpPr>
+            <a:stCxn id="8" idx="3"/>
+            <a:endCxn id="56" idx="0"/>
+          </p:cNvCxnSpPr>
+          <p:nvPr/>
+        </p:nvCxnSpPr>
+        <p:spPr>
+          <a:xfrm>
+            <a:off x="5624945" y="469298"/>
+            <a:ext cx="1721209" cy="729350"/>
+          </a:xfrm>
+          <a:prstGeom prst="bentConnector2">
             <a:avLst/>
           </a:prstGeom>
           <a:ln>

</xml_diff>

<commit_message>
move data arrays to index.js
</commit_message>
<xml_diff>
--- a/nesting map.pptx
+++ b/nesting map.pptx
@@ -5,8 +5,8 @@
     <p:sldMasterId id="2147483648" r:id="rId1"/>
   </p:sldMasterIdLst>
   <p:sldIdLst>
-    <p:sldId id="257" r:id="rId2"/>
-    <p:sldId id="256" r:id="rId3"/>
+    <p:sldId id="256" r:id="rId2"/>
+    <p:sldId id="257" r:id="rId3"/>
   </p:sldIdLst>
   <p:sldSz cx="12192000" cy="6858000"/>
   <p:notesSz cx="6858000" cy="9144000"/>
@@ -2970,697 +2970,10 @@
           <a:chExt cx="0" cy="0"/>
         </a:xfrm>
       </p:grpSpPr>
-      <p:sp>
-        <p:nvSpPr>
-          <p:cNvPr id="4" name="Прямоугольник 3"/>
-          <p:cNvSpPr/>
-          <p:nvPr/>
-        </p:nvSpPr>
-        <p:spPr>
-          <a:xfrm>
-            <a:off x="3003034" y="279952"/>
-            <a:ext cx="903948" cy="378691"/>
-          </a:xfrm>
-          <a:prstGeom prst="rect">
-            <a:avLst/>
-          </a:prstGeom>
-        </p:spPr>
-        <p:style>
-          <a:lnRef idx="2">
-            <a:schemeClr val="accent1">
-              <a:shade val="50000"/>
-            </a:schemeClr>
-          </a:lnRef>
-          <a:fillRef idx="1">
-            <a:schemeClr val="accent1"/>
-          </a:fillRef>
-          <a:effectRef idx="0">
-            <a:schemeClr val="accent1"/>
-          </a:effectRef>
-          <a:fontRef idx="minor">
-            <a:schemeClr val="lt1"/>
-          </a:fontRef>
-        </p:style>
-        <p:txBody>
-          <a:bodyPr rtlCol="0" anchor="ctr"/>
-          <a:lstStyle/>
-          <a:p>
-            <a:pPr algn="ctr"/>
-            <a:r>
-              <a:rPr lang="en-US" dirty="0" smtClean="0"/>
-              <a:t>Index.js</a:t>
-            </a:r>
-            <a:endParaRPr lang="ru-RU" dirty="0"/>
-          </a:p>
-        </p:txBody>
-      </p:sp>
-      <p:sp>
-        <p:nvSpPr>
-          <p:cNvPr id="8" name="Прямоугольник 7"/>
-          <p:cNvSpPr/>
-          <p:nvPr/>
-        </p:nvSpPr>
-        <p:spPr>
-          <a:xfrm>
-            <a:off x="4836160" y="279952"/>
-            <a:ext cx="788785" cy="378691"/>
-          </a:xfrm>
-          <a:prstGeom prst="rect">
-            <a:avLst/>
-          </a:prstGeom>
-        </p:spPr>
-        <p:style>
-          <a:lnRef idx="2">
-            <a:schemeClr val="accent1">
-              <a:shade val="50000"/>
-            </a:schemeClr>
-          </a:lnRef>
-          <a:fillRef idx="1">
-            <a:schemeClr val="accent1"/>
-          </a:fillRef>
-          <a:effectRef idx="0">
-            <a:schemeClr val="accent1"/>
-          </a:effectRef>
-          <a:fontRef idx="minor">
-            <a:schemeClr val="lt1"/>
-          </a:fontRef>
-        </p:style>
-        <p:txBody>
-          <a:bodyPr rtlCol="0" anchor="ctr"/>
-          <a:lstStyle/>
-          <a:p>
-            <a:pPr algn="ctr"/>
-            <a:r>
-              <a:rPr lang="en-US" dirty="0" smtClean="0"/>
-              <a:t>App.js</a:t>
-            </a:r>
-          </a:p>
-        </p:txBody>
-      </p:sp>
-      <p:sp>
-        <p:nvSpPr>
-          <p:cNvPr id="12" name="Прямоугольник 11"/>
-          <p:cNvSpPr/>
-          <p:nvPr/>
-        </p:nvSpPr>
-        <p:spPr>
-          <a:xfrm>
-            <a:off x="402845" y="1208577"/>
-            <a:ext cx="917955" cy="375920"/>
-          </a:xfrm>
-          <a:prstGeom prst="rect">
-            <a:avLst/>
-          </a:prstGeom>
-        </p:spPr>
-        <p:style>
-          <a:lnRef idx="2">
-            <a:schemeClr val="accent1">
-              <a:shade val="50000"/>
-            </a:schemeClr>
-          </a:lnRef>
-          <a:fillRef idx="1">
-            <a:schemeClr val="accent1"/>
-          </a:fillRef>
-          <a:effectRef idx="0">
-            <a:schemeClr val="accent1"/>
-          </a:effectRef>
-          <a:fontRef idx="minor">
-            <a:schemeClr val="lt1"/>
-          </a:fontRef>
-        </p:style>
-        <p:txBody>
-          <a:bodyPr rtlCol="0" anchor="ctr"/>
-          <a:lstStyle/>
-          <a:p>
-            <a:pPr algn="ctr"/>
-            <a:r>
-              <a:rPr lang="en-US" dirty="0" smtClean="0"/>
-              <a:t>Header</a:t>
-            </a:r>
-            <a:endParaRPr lang="ru-RU" dirty="0"/>
-          </a:p>
-        </p:txBody>
-      </p:sp>
-      <p:cxnSp>
-        <p:nvCxnSpPr>
-          <p:cNvPr id="16" name="Соединительная линия уступом 15"/>
-          <p:cNvCxnSpPr>
-            <a:stCxn id="8" idx="2"/>
-            <a:endCxn id="12" idx="0"/>
-          </p:cNvCxnSpPr>
-          <p:nvPr/>
-        </p:nvCxnSpPr>
-        <p:spPr>
-          <a:xfrm rot="5400000">
-            <a:off x="2771221" y="-1250755"/>
-            <a:ext cx="549934" cy="4368730"/>
-          </a:xfrm>
-          <a:prstGeom prst="bentConnector3">
-            <a:avLst>
-              <a:gd name="adj1" fmla="val 50000"/>
-            </a:avLst>
-          </a:prstGeom>
-          <a:ln>
-            <a:tailEnd type="triangle"/>
-          </a:ln>
-        </p:spPr>
-        <p:style>
-          <a:lnRef idx="3">
-            <a:schemeClr val="accent6"/>
-          </a:lnRef>
-          <a:fillRef idx="0">
-            <a:schemeClr val="accent6"/>
-          </a:fillRef>
-          <a:effectRef idx="2">
-            <a:schemeClr val="accent6"/>
-          </a:effectRef>
-          <a:fontRef idx="minor">
-            <a:schemeClr val="tx1"/>
-          </a:fontRef>
-        </p:style>
-      </p:cxnSp>
-      <p:sp>
-        <p:nvSpPr>
-          <p:cNvPr id="18" name="Прямоугольник 17"/>
-          <p:cNvSpPr/>
-          <p:nvPr/>
-        </p:nvSpPr>
-        <p:spPr>
-          <a:xfrm>
-            <a:off x="4793883" y="1242915"/>
-            <a:ext cx="873337" cy="386080"/>
-          </a:xfrm>
-          <a:prstGeom prst="rect">
-            <a:avLst/>
-          </a:prstGeom>
-        </p:spPr>
-        <p:style>
-          <a:lnRef idx="2">
-            <a:schemeClr val="accent1">
-              <a:shade val="50000"/>
-            </a:schemeClr>
-          </a:lnRef>
-          <a:fillRef idx="1">
-            <a:schemeClr val="accent1"/>
-          </a:fillRef>
-          <a:effectRef idx="0">
-            <a:schemeClr val="accent1"/>
-          </a:effectRef>
-          <a:fontRef idx="minor">
-            <a:schemeClr val="lt1"/>
-          </a:fontRef>
-        </p:style>
-        <p:txBody>
-          <a:bodyPr rtlCol="0" anchor="ctr"/>
-          <a:lstStyle/>
-          <a:p>
-            <a:pPr algn="ctr"/>
-            <a:r>
-              <a:rPr lang="en-US" dirty="0" err="1" smtClean="0"/>
-              <a:t>Navbar</a:t>
-            </a:r>
-            <a:endParaRPr lang="ru-RU" dirty="0"/>
-          </a:p>
-        </p:txBody>
-      </p:sp>
-      <p:cxnSp>
-        <p:nvCxnSpPr>
-          <p:cNvPr id="26" name="Прямая со стрелкой 25"/>
-          <p:cNvCxnSpPr>
-            <a:stCxn id="8" idx="2"/>
-            <a:endCxn id="18" idx="0"/>
-          </p:cNvCxnSpPr>
-          <p:nvPr/>
-        </p:nvCxnSpPr>
-        <p:spPr>
-          <a:xfrm flipH="1">
-            <a:off x="5230552" y="658643"/>
-            <a:ext cx="1" cy="584272"/>
-          </a:xfrm>
-          <a:prstGeom prst="straightConnector1">
-            <a:avLst/>
-          </a:prstGeom>
-          <a:ln>
-            <a:tailEnd type="triangle"/>
-          </a:ln>
-        </p:spPr>
-        <p:style>
-          <a:lnRef idx="3">
-            <a:schemeClr val="accent6"/>
-          </a:lnRef>
-          <a:fillRef idx="0">
-            <a:schemeClr val="accent6"/>
-          </a:fillRef>
-          <a:effectRef idx="2">
-            <a:schemeClr val="accent6"/>
-          </a:effectRef>
-          <a:fontRef idx="minor">
-            <a:schemeClr val="tx1"/>
-          </a:fontRef>
-        </p:style>
-      </p:cxnSp>
-      <p:sp>
-        <p:nvSpPr>
-          <p:cNvPr id="28" name="Прямоугольник 27"/>
-          <p:cNvSpPr/>
-          <p:nvPr/>
-        </p:nvSpPr>
-        <p:spPr>
-          <a:xfrm>
-            <a:off x="10030328" y="1192414"/>
-            <a:ext cx="881734" cy="391160"/>
-          </a:xfrm>
-          <a:prstGeom prst="rect">
-            <a:avLst/>
-          </a:prstGeom>
-        </p:spPr>
-        <p:style>
-          <a:lnRef idx="2">
-            <a:schemeClr val="accent1">
-              <a:shade val="50000"/>
-            </a:schemeClr>
-          </a:lnRef>
-          <a:fillRef idx="1">
-            <a:schemeClr val="accent1"/>
-          </a:fillRef>
-          <a:effectRef idx="0">
-            <a:schemeClr val="accent1"/>
-          </a:effectRef>
-          <a:fontRef idx="minor">
-            <a:schemeClr val="lt1"/>
-          </a:fontRef>
-        </p:style>
-        <p:txBody>
-          <a:bodyPr rtlCol="0" anchor="ctr"/>
-          <a:lstStyle/>
-          <a:p>
-            <a:pPr algn="ctr"/>
-            <a:r>
-              <a:rPr lang="en-US" dirty="0" smtClean="0"/>
-              <a:t>Profile</a:t>
-            </a:r>
-            <a:endParaRPr lang="en-US" dirty="0" smtClean="0"/>
-          </a:p>
-        </p:txBody>
-      </p:sp>
-      <p:cxnSp>
-        <p:nvCxnSpPr>
-          <p:cNvPr id="34" name="Соединительная линия уступом 33"/>
-          <p:cNvCxnSpPr>
-            <a:stCxn id="8" idx="3"/>
-            <a:endCxn id="28" idx="0"/>
-          </p:cNvCxnSpPr>
-          <p:nvPr/>
-        </p:nvCxnSpPr>
-        <p:spPr>
-          <a:xfrm>
-            <a:off x="5624945" y="469298"/>
-            <a:ext cx="4846250" cy="723116"/>
-          </a:xfrm>
-          <a:prstGeom prst="bentConnector2">
-            <a:avLst/>
-          </a:prstGeom>
-          <a:ln>
-            <a:tailEnd type="triangle"/>
-          </a:ln>
-        </p:spPr>
-        <p:style>
-          <a:lnRef idx="3">
-            <a:schemeClr val="accent6"/>
-          </a:lnRef>
-          <a:fillRef idx="0">
-            <a:schemeClr val="accent6"/>
-          </a:fillRef>
-          <a:effectRef idx="2">
-            <a:schemeClr val="accent6"/>
-          </a:effectRef>
-          <a:fontRef idx="minor">
-            <a:schemeClr val="tx1"/>
-          </a:fontRef>
-        </p:style>
-      </p:cxnSp>
-      <p:cxnSp>
-        <p:nvCxnSpPr>
-          <p:cNvPr id="17" name="Соединительная линия уступом 16"/>
-          <p:cNvCxnSpPr>
-            <a:stCxn id="4" idx="0"/>
-            <a:endCxn id="8" idx="0"/>
-          </p:cNvCxnSpPr>
-          <p:nvPr/>
-        </p:nvCxnSpPr>
-        <p:spPr>
-          <a:xfrm rot="5400000" flipH="1" flipV="1">
-            <a:off x="4342780" y="-607820"/>
-            <a:ext cx="12700" cy="1775545"/>
-          </a:xfrm>
-          <a:prstGeom prst="bentConnector3">
-            <a:avLst>
-              <a:gd name="adj1" fmla="val 1800000"/>
-            </a:avLst>
-          </a:prstGeom>
-          <a:ln>
-            <a:tailEnd type="triangle"/>
-          </a:ln>
-        </p:spPr>
-        <p:style>
-          <a:lnRef idx="3">
-            <a:schemeClr val="accent6"/>
-          </a:lnRef>
-          <a:fillRef idx="0">
-            <a:schemeClr val="accent6"/>
-          </a:fillRef>
-          <a:effectRef idx="2">
-            <a:schemeClr val="accent6"/>
-          </a:effectRef>
-          <a:fontRef idx="minor">
-            <a:schemeClr val="tx1"/>
-          </a:fontRef>
-        </p:style>
-      </p:cxnSp>
-      <p:sp>
-        <p:nvSpPr>
-          <p:cNvPr id="32" name="Прямоугольник 31"/>
-          <p:cNvSpPr/>
-          <p:nvPr/>
-        </p:nvSpPr>
-        <p:spPr>
-          <a:xfrm>
-            <a:off x="9035972" y="1871105"/>
-            <a:ext cx="994356" cy="341746"/>
-          </a:xfrm>
-          <a:prstGeom prst="rect">
-            <a:avLst/>
-          </a:prstGeom>
-        </p:spPr>
-        <p:style>
-          <a:lnRef idx="2">
-            <a:schemeClr val="accent1">
-              <a:shade val="50000"/>
-            </a:schemeClr>
-          </a:lnRef>
-          <a:fillRef idx="1">
-            <a:schemeClr val="accent1"/>
-          </a:fillRef>
-          <a:effectRef idx="0">
-            <a:schemeClr val="accent1"/>
-          </a:effectRef>
-          <a:fontRef idx="minor">
-            <a:schemeClr val="lt1"/>
-          </a:fontRef>
-        </p:style>
-        <p:txBody>
-          <a:bodyPr rtlCol="0" anchor="ctr"/>
-          <a:lstStyle/>
-          <a:p>
-            <a:pPr algn="ctr"/>
-            <a:r>
-              <a:rPr lang="en-US" dirty="0" err="1" smtClean="0"/>
-              <a:t>MyPosts</a:t>
-            </a:r>
-            <a:endParaRPr lang="ru-RU" dirty="0"/>
-          </a:p>
-        </p:txBody>
-      </p:sp>
-      <p:sp>
-        <p:nvSpPr>
-          <p:cNvPr id="36" name="Прямоугольник 35"/>
-          <p:cNvSpPr/>
-          <p:nvPr/>
-        </p:nvSpPr>
-        <p:spPr>
-          <a:xfrm>
-            <a:off x="9229935" y="2531323"/>
-            <a:ext cx="606429" cy="360219"/>
-          </a:xfrm>
-          <a:prstGeom prst="rect">
-            <a:avLst/>
-          </a:prstGeom>
-        </p:spPr>
-        <p:style>
-          <a:lnRef idx="2">
-            <a:schemeClr val="accent1">
-              <a:shade val="50000"/>
-            </a:schemeClr>
-          </a:lnRef>
-          <a:fillRef idx="1">
-            <a:schemeClr val="accent1"/>
-          </a:fillRef>
-          <a:effectRef idx="0">
-            <a:schemeClr val="accent1"/>
-          </a:effectRef>
-          <a:fontRef idx="minor">
-            <a:schemeClr val="lt1"/>
-          </a:fontRef>
-        </p:style>
-        <p:txBody>
-          <a:bodyPr rtlCol="0" anchor="ctr"/>
-          <a:lstStyle/>
-          <a:p>
-            <a:pPr algn="ctr"/>
-            <a:r>
-              <a:rPr lang="en-US" dirty="0" smtClean="0"/>
-              <a:t>Post</a:t>
-            </a:r>
-            <a:endParaRPr lang="ru-RU" dirty="0"/>
-          </a:p>
-        </p:txBody>
-      </p:sp>
-      <p:cxnSp>
-        <p:nvCxnSpPr>
-          <p:cNvPr id="41" name="Прямая со стрелкой 40"/>
-          <p:cNvCxnSpPr>
-            <a:stCxn id="32" idx="2"/>
-            <a:endCxn id="36" idx="0"/>
-          </p:cNvCxnSpPr>
-          <p:nvPr/>
-        </p:nvCxnSpPr>
-        <p:spPr>
-          <a:xfrm>
-            <a:off x="9533150" y="2212851"/>
-            <a:ext cx="0" cy="318472"/>
-          </a:xfrm>
-          <a:prstGeom prst="straightConnector1">
-            <a:avLst/>
-          </a:prstGeom>
-          <a:ln>
-            <a:tailEnd type="triangle"/>
-          </a:ln>
-        </p:spPr>
-        <p:style>
-          <a:lnRef idx="3">
-            <a:schemeClr val="accent6"/>
-          </a:lnRef>
-          <a:fillRef idx="0">
-            <a:schemeClr val="accent6"/>
-          </a:fillRef>
-          <a:effectRef idx="2">
-            <a:schemeClr val="accent6"/>
-          </a:effectRef>
-          <a:fontRef idx="minor">
-            <a:schemeClr val="tx1"/>
-          </a:fontRef>
-        </p:style>
-      </p:cxnSp>
-      <p:cxnSp>
-        <p:nvCxnSpPr>
-          <p:cNvPr id="7" name="Соединительная линия уступом 6"/>
-          <p:cNvCxnSpPr>
-            <a:stCxn id="28" idx="1"/>
-            <a:endCxn id="32" idx="0"/>
-          </p:cNvCxnSpPr>
-          <p:nvPr/>
-        </p:nvCxnSpPr>
-        <p:spPr>
-          <a:xfrm rot="10800000" flipV="1">
-            <a:off x="9533150" y="1387993"/>
-            <a:ext cx="497178" cy="483111"/>
-          </a:xfrm>
-          <a:prstGeom prst="bentConnector2">
-            <a:avLst/>
-          </a:prstGeom>
-          <a:ln>
-            <a:tailEnd type="triangle"/>
-          </a:ln>
-        </p:spPr>
-        <p:style>
-          <a:lnRef idx="3">
-            <a:schemeClr val="accent6"/>
-          </a:lnRef>
-          <a:fillRef idx="0">
-            <a:schemeClr val="accent6"/>
-          </a:fillRef>
-          <a:effectRef idx="2">
-            <a:schemeClr val="accent6"/>
-          </a:effectRef>
-          <a:fontRef idx="minor">
-            <a:schemeClr val="tx1"/>
-          </a:fontRef>
-        </p:style>
-      </p:cxnSp>
-      <p:sp>
-        <p:nvSpPr>
-          <p:cNvPr id="11" name="Прямоугольник 10"/>
-          <p:cNvSpPr/>
-          <p:nvPr/>
-        </p:nvSpPr>
-        <p:spPr>
-          <a:xfrm>
-            <a:off x="10912062" y="1882280"/>
-            <a:ext cx="1163782" cy="341747"/>
-          </a:xfrm>
-          <a:prstGeom prst="rect">
-            <a:avLst/>
-          </a:prstGeom>
-        </p:spPr>
-        <p:style>
-          <a:lnRef idx="2">
-            <a:schemeClr val="accent1">
-              <a:shade val="50000"/>
-            </a:schemeClr>
-          </a:lnRef>
-          <a:fillRef idx="1">
-            <a:schemeClr val="accent1"/>
-          </a:fillRef>
-          <a:effectRef idx="0">
-            <a:schemeClr val="accent1"/>
-          </a:effectRef>
-          <a:fontRef idx="minor">
-            <a:schemeClr val="lt1"/>
-          </a:fontRef>
-        </p:style>
-        <p:txBody>
-          <a:bodyPr rtlCol="0" anchor="ctr"/>
-          <a:lstStyle/>
-          <a:p>
-            <a:pPr algn="ctr"/>
-            <a:r>
-              <a:rPr lang="en-US" dirty="0" err="1" smtClean="0"/>
-              <a:t>ProfileInfo</a:t>
-            </a:r>
-            <a:endParaRPr lang="en-US" dirty="0"/>
-          </a:p>
-        </p:txBody>
-      </p:sp>
-      <p:cxnSp>
-        <p:nvCxnSpPr>
-          <p:cNvPr id="14" name="Соединительная линия уступом 13"/>
-          <p:cNvCxnSpPr>
-            <a:stCxn id="28" idx="3"/>
-            <a:endCxn id="11" idx="0"/>
-          </p:cNvCxnSpPr>
-          <p:nvPr/>
-        </p:nvCxnSpPr>
-        <p:spPr>
-          <a:xfrm>
-            <a:off x="10912062" y="1387994"/>
-            <a:ext cx="581891" cy="494286"/>
-          </a:xfrm>
-          <a:prstGeom prst="bentConnector2">
-            <a:avLst/>
-          </a:prstGeom>
-          <a:ln>
-            <a:tailEnd type="triangle"/>
-          </a:ln>
-        </p:spPr>
-        <p:style>
-          <a:lnRef idx="3">
-            <a:schemeClr val="accent6"/>
-          </a:lnRef>
-          <a:fillRef idx="0">
-            <a:schemeClr val="accent6"/>
-          </a:fillRef>
-          <a:effectRef idx="2">
-            <a:schemeClr val="accent6"/>
-          </a:effectRef>
-          <a:fontRef idx="minor">
-            <a:schemeClr val="tx1"/>
-          </a:fontRef>
-        </p:style>
-      </p:cxnSp>
-      <p:sp>
-        <p:nvSpPr>
-          <p:cNvPr id="56" name="Прямоугольник 55"/>
-          <p:cNvSpPr/>
-          <p:nvPr/>
-        </p:nvSpPr>
-        <p:spPr>
-          <a:xfrm>
-            <a:off x="6915289" y="1198648"/>
-            <a:ext cx="861730" cy="378691"/>
-          </a:xfrm>
-          <a:prstGeom prst="rect">
-            <a:avLst/>
-          </a:prstGeom>
-        </p:spPr>
-        <p:style>
-          <a:lnRef idx="2">
-            <a:schemeClr val="accent1">
-              <a:shade val="50000"/>
-            </a:schemeClr>
-          </a:lnRef>
-          <a:fillRef idx="1">
-            <a:schemeClr val="accent1"/>
-          </a:fillRef>
-          <a:effectRef idx="0">
-            <a:schemeClr val="accent1"/>
-          </a:effectRef>
-          <a:fontRef idx="minor">
-            <a:schemeClr val="lt1"/>
-          </a:fontRef>
-        </p:style>
-        <p:txBody>
-          <a:bodyPr rtlCol="0" anchor="ctr"/>
-          <a:lstStyle/>
-          <a:p>
-            <a:pPr algn="ctr"/>
-            <a:r>
-              <a:rPr lang="en-US" dirty="0" smtClean="0"/>
-              <a:t>Dialogs</a:t>
-            </a:r>
-            <a:endParaRPr lang="ru-RU" dirty="0"/>
-          </a:p>
-        </p:txBody>
-      </p:sp>
-      <p:cxnSp>
-        <p:nvCxnSpPr>
-          <p:cNvPr id="58" name="Соединительная линия уступом 57"/>
-          <p:cNvCxnSpPr>
-            <a:stCxn id="8" idx="3"/>
-            <a:endCxn id="56" idx="0"/>
-          </p:cNvCxnSpPr>
-          <p:nvPr/>
-        </p:nvCxnSpPr>
-        <p:spPr>
-          <a:xfrm>
-            <a:off x="5624945" y="469298"/>
-            <a:ext cx="1721209" cy="729350"/>
-          </a:xfrm>
-          <a:prstGeom prst="bentConnector2">
-            <a:avLst/>
-          </a:prstGeom>
-          <a:ln>
-            <a:tailEnd type="triangle"/>
-          </a:ln>
-        </p:spPr>
-        <p:style>
-          <a:lnRef idx="3">
-            <a:schemeClr val="accent6"/>
-          </a:lnRef>
-          <a:fillRef idx="0">
-            <a:schemeClr val="accent6"/>
-          </a:fillRef>
-          <a:effectRef idx="2">
-            <a:schemeClr val="accent6"/>
-          </a:effectRef>
-          <a:fontRef idx="minor">
-            <a:schemeClr val="tx1"/>
-          </a:fontRef>
-        </p:style>
-      </p:cxnSp>
     </p:spTree>
     <p:extLst>
       <p:ext uri="{BB962C8B-B14F-4D97-AF65-F5344CB8AC3E}">
-        <p14:creationId xmlns:p14="http://schemas.microsoft.com/office/powerpoint/2010/main" val="3123048679"/>
+        <p14:creationId xmlns:p14="http://schemas.microsoft.com/office/powerpoint/2010/main" val="3592661769"/>
       </p:ext>
     </p:extLst>
   </p:cSld>
@@ -3687,16 +3000,1105 @@
           <a:chExt cx="0" cy="0"/>
         </a:xfrm>
       </p:grpSpPr>
+      <p:sp>
+        <p:nvSpPr>
+          <p:cNvPr id="4" name="Прямоугольник 3"/>
+          <p:cNvSpPr/>
+          <p:nvPr/>
+        </p:nvSpPr>
+        <p:spPr>
+          <a:xfrm>
+            <a:off x="995161" y="55326"/>
+            <a:ext cx="903948" cy="378691"/>
+          </a:xfrm>
+          <a:prstGeom prst="rect">
+            <a:avLst/>
+          </a:prstGeom>
+        </p:spPr>
+        <p:style>
+          <a:lnRef idx="2">
+            <a:schemeClr val="accent1">
+              <a:shade val="50000"/>
+            </a:schemeClr>
+          </a:lnRef>
+          <a:fillRef idx="1">
+            <a:schemeClr val="accent1"/>
+          </a:fillRef>
+          <a:effectRef idx="0">
+            <a:schemeClr val="accent1"/>
+          </a:effectRef>
+          <a:fontRef idx="minor">
+            <a:schemeClr val="lt1"/>
+          </a:fontRef>
+        </p:style>
+        <p:txBody>
+          <a:bodyPr rtlCol="0" anchor="ctr"/>
+          <a:lstStyle/>
+          <a:p>
+            <a:pPr algn="ctr"/>
+            <a:r>
+              <a:rPr lang="en-US" dirty="0" smtClean="0"/>
+              <a:t>Index.js</a:t>
+            </a:r>
+            <a:endParaRPr lang="ru-RU" dirty="0"/>
+          </a:p>
+        </p:txBody>
+      </p:sp>
+      <p:sp>
+        <p:nvSpPr>
+          <p:cNvPr id="8" name="Прямоугольник 7"/>
+          <p:cNvSpPr/>
+          <p:nvPr/>
+        </p:nvSpPr>
+        <p:spPr>
+          <a:xfrm>
+            <a:off x="4633937" y="948167"/>
+            <a:ext cx="788785" cy="378691"/>
+          </a:xfrm>
+          <a:prstGeom prst="rect">
+            <a:avLst/>
+          </a:prstGeom>
+        </p:spPr>
+        <p:style>
+          <a:lnRef idx="2">
+            <a:schemeClr val="accent1">
+              <a:shade val="50000"/>
+            </a:schemeClr>
+          </a:lnRef>
+          <a:fillRef idx="1">
+            <a:schemeClr val="accent1"/>
+          </a:fillRef>
+          <a:effectRef idx="0">
+            <a:schemeClr val="accent1"/>
+          </a:effectRef>
+          <a:fontRef idx="minor">
+            <a:schemeClr val="lt1"/>
+          </a:fontRef>
+        </p:style>
+        <p:txBody>
+          <a:bodyPr rtlCol="0" anchor="ctr"/>
+          <a:lstStyle/>
+          <a:p>
+            <a:pPr algn="ctr"/>
+            <a:r>
+              <a:rPr lang="en-US" dirty="0" smtClean="0"/>
+              <a:t>App.js</a:t>
+            </a:r>
+          </a:p>
+        </p:txBody>
+      </p:sp>
+      <p:sp>
+        <p:nvSpPr>
+          <p:cNvPr id="12" name="Прямоугольник 11"/>
+          <p:cNvSpPr/>
+          <p:nvPr/>
+        </p:nvSpPr>
+        <p:spPr>
+          <a:xfrm>
+            <a:off x="458830" y="2448665"/>
+            <a:ext cx="917955" cy="386080"/>
+          </a:xfrm>
+          <a:prstGeom prst="rect">
+            <a:avLst/>
+          </a:prstGeom>
+        </p:spPr>
+        <p:style>
+          <a:lnRef idx="2">
+            <a:schemeClr val="accent1">
+              <a:shade val="50000"/>
+            </a:schemeClr>
+          </a:lnRef>
+          <a:fillRef idx="1">
+            <a:schemeClr val="accent1"/>
+          </a:fillRef>
+          <a:effectRef idx="0">
+            <a:schemeClr val="accent1"/>
+          </a:effectRef>
+          <a:fontRef idx="minor">
+            <a:schemeClr val="lt1"/>
+          </a:fontRef>
+        </p:style>
+        <p:txBody>
+          <a:bodyPr rtlCol="0" anchor="ctr"/>
+          <a:lstStyle/>
+          <a:p>
+            <a:pPr algn="ctr"/>
+            <a:r>
+              <a:rPr lang="en-US" dirty="0" smtClean="0"/>
+              <a:t>Header</a:t>
+            </a:r>
+            <a:endParaRPr lang="ru-RU" dirty="0"/>
+          </a:p>
+        </p:txBody>
+      </p:sp>
+      <p:cxnSp>
+        <p:nvCxnSpPr>
+          <p:cNvPr id="16" name="Соединительная линия уступом 15"/>
+          <p:cNvCxnSpPr>
+            <a:stCxn id="8" idx="2"/>
+            <a:endCxn id="12" idx="0"/>
+          </p:cNvCxnSpPr>
+          <p:nvPr/>
+        </p:nvCxnSpPr>
+        <p:spPr>
+          <a:xfrm rot="5400000">
+            <a:off x="2412166" y="-167500"/>
+            <a:ext cx="1121807" cy="4110522"/>
+          </a:xfrm>
+          <a:prstGeom prst="bentConnector3">
+            <a:avLst>
+              <a:gd name="adj1" fmla="val 89188"/>
+            </a:avLst>
+          </a:prstGeom>
+          <a:ln>
+            <a:tailEnd type="triangle"/>
+          </a:ln>
+        </p:spPr>
+        <p:style>
+          <a:lnRef idx="3">
+            <a:schemeClr val="accent6"/>
+          </a:lnRef>
+          <a:fillRef idx="0">
+            <a:schemeClr val="accent6"/>
+          </a:fillRef>
+          <a:effectRef idx="2">
+            <a:schemeClr val="accent6"/>
+          </a:effectRef>
+          <a:fontRef idx="minor">
+            <a:schemeClr val="tx1"/>
+          </a:fontRef>
+        </p:style>
+      </p:cxnSp>
+      <p:sp>
+        <p:nvSpPr>
+          <p:cNvPr id="18" name="Прямоугольник 17"/>
+          <p:cNvSpPr/>
+          <p:nvPr/>
+        </p:nvSpPr>
+        <p:spPr>
+          <a:xfrm>
+            <a:off x="3334807" y="2434420"/>
+            <a:ext cx="873337" cy="386080"/>
+          </a:xfrm>
+          <a:prstGeom prst="rect">
+            <a:avLst/>
+          </a:prstGeom>
+        </p:spPr>
+        <p:style>
+          <a:lnRef idx="2">
+            <a:schemeClr val="accent1">
+              <a:shade val="50000"/>
+            </a:schemeClr>
+          </a:lnRef>
+          <a:fillRef idx="1">
+            <a:schemeClr val="accent1"/>
+          </a:fillRef>
+          <a:effectRef idx="0">
+            <a:schemeClr val="accent1"/>
+          </a:effectRef>
+          <a:fontRef idx="minor">
+            <a:schemeClr val="lt1"/>
+          </a:fontRef>
+        </p:style>
+        <p:txBody>
+          <a:bodyPr rtlCol="0" anchor="ctr"/>
+          <a:lstStyle/>
+          <a:p>
+            <a:pPr algn="ctr"/>
+            <a:r>
+              <a:rPr lang="en-US" dirty="0" err="1" smtClean="0"/>
+              <a:t>Navbar</a:t>
+            </a:r>
+            <a:endParaRPr lang="ru-RU" dirty="0"/>
+          </a:p>
+        </p:txBody>
+      </p:sp>
+      <p:sp>
+        <p:nvSpPr>
+          <p:cNvPr id="28" name="Прямоугольник 27"/>
+          <p:cNvSpPr/>
+          <p:nvPr/>
+        </p:nvSpPr>
+        <p:spPr>
+          <a:xfrm>
+            <a:off x="9740182" y="2423337"/>
+            <a:ext cx="881734" cy="391160"/>
+          </a:xfrm>
+          <a:prstGeom prst="rect">
+            <a:avLst/>
+          </a:prstGeom>
+        </p:spPr>
+        <p:style>
+          <a:lnRef idx="2">
+            <a:schemeClr val="accent1">
+              <a:shade val="50000"/>
+            </a:schemeClr>
+          </a:lnRef>
+          <a:fillRef idx="1">
+            <a:schemeClr val="accent1"/>
+          </a:fillRef>
+          <a:effectRef idx="0">
+            <a:schemeClr val="accent1"/>
+          </a:effectRef>
+          <a:fontRef idx="minor">
+            <a:schemeClr val="lt1"/>
+          </a:fontRef>
+        </p:style>
+        <p:txBody>
+          <a:bodyPr rtlCol="0" anchor="ctr"/>
+          <a:lstStyle/>
+          <a:p>
+            <a:pPr algn="ctr"/>
+            <a:r>
+              <a:rPr lang="en-US" dirty="0" smtClean="0"/>
+              <a:t>Profile</a:t>
+            </a:r>
+          </a:p>
+        </p:txBody>
+      </p:sp>
+      <p:cxnSp>
+        <p:nvCxnSpPr>
+          <p:cNvPr id="34" name="Соединительная линия уступом 33"/>
+          <p:cNvCxnSpPr>
+            <a:stCxn id="8" idx="3"/>
+            <a:endCxn id="28" idx="0"/>
+          </p:cNvCxnSpPr>
+          <p:nvPr/>
+        </p:nvCxnSpPr>
+        <p:spPr>
+          <a:xfrm>
+            <a:off x="5422722" y="1137513"/>
+            <a:ext cx="4758327" cy="1285824"/>
+          </a:xfrm>
+          <a:prstGeom prst="bentConnector2">
+            <a:avLst/>
+          </a:prstGeom>
+          <a:ln>
+            <a:tailEnd type="triangle"/>
+          </a:ln>
+        </p:spPr>
+        <p:style>
+          <a:lnRef idx="3">
+            <a:schemeClr val="accent6"/>
+          </a:lnRef>
+          <a:fillRef idx="0">
+            <a:schemeClr val="accent6"/>
+          </a:fillRef>
+          <a:effectRef idx="2">
+            <a:schemeClr val="accent6"/>
+          </a:effectRef>
+          <a:fontRef idx="minor">
+            <a:schemeClr val="tx1"/>
+          </a:fontRef>
+        </p:style>
+      </p:cxnSp>
+      <p:cxnSp>
+        <p:nvCxnSpPr>
+          <p:cNvPr id="17" name="Соединительная линия уступом 16"/>
+          <p:cNvCxnSpPr>
+            <a:stCxn id="51" idx="2"/>
+            <a:endCxn id="8" idx="1"/>
+          </p:cNvCxnSpPr>
+          <p:nvPr/>
+        </p:nvCxnSpPr>
+        <p:spPr>
+          <a:xfrm rot="16200000" flipH="1">
+            <a:off x="2626337" y="-870088"/>
+            <a:ext cx="171373" cy="3843828"/>
+          </a:xfrm>
+          <a:prstGeom prst="bentConnector2">
+            <a:avLst/>
+          </a:prstGeom>
+          <a:ln>
+            <a:tailEnd type="triangle"/>
+          </a:ln>
+        </p:spPr>
+        <p:style>
+          <a:lnRef idx="3">
+            <a:schemeClr val="accent2"/>
+          </a:lnRef>
+          <a:fillRef idx="0">
+            <a:schemeClr val="accent2"/>
+          </a:fillRef>
+          <a:effectRef idx="2">
+            <a:schemeClr val="accent2"/>
+          </a:effectRef>
+          <a:fontRef idx="minor">
+            <a:schemeClr val="tx1"/>
+          </a:fontRef>
+        </p:style>
+      </p:cxnSp>
+      <p:sp>
+        <p:nvSpPr>
+          <p:cNvPr id="32" name="Прямоугольник 31"/>
+          <p:cNvSpPr/>
+          <p:nvPr/>
+        </p:nvSpPr>
+        <p:spPr>
+          <a:xfrm>
+            <a:off x="8745826" y="3102028"/>
+            <a:ext cx="994356" cy="341746"/>
+          </a:xfrm>
+          <a:prstGeom prst="rect">
+            <a:avLst/>
+          </a:prstGeom>
+        </p:spPr>
+        <p:style>
+          <a:lnRef idx="2">
+            <a:schemeClr val="accent1">
+              <a:shade val="50000"/>
+            </a:schemeClr>
+          </a:lnRef>
+          <a:fillRef idx="1">
+            <a:schemeClr val="accent1"/>
+          </a:fillRef>
+          <a:effectRef idx="0">
+            <a:schemeClr val="accent1"/>
+          </a:effectRef>
+          <a:fontRef idx="minor">
+            <a:schemeClr val="lt1"/>
+          </a:fontRef>
+        </p:style>
+        <p:txBody>
+          <a:bodyPr rtlCol="0" anchor="ctr"/>
+          <a:lstStyle/>
+          <a:p>
+            <a:pPr algn="ctr"/>
+            <a:r>
+              <a:rPr lang="en-US" dirty="0" err="1" smtClean="0"/>
+              <a:t>MyPosts</a:t>
+            </a:r>
+            <a:endParaRPr lang="ru-RU" dirty="0"/>
+          </a:p>
+        </p:txBody>
+      </p:sp>
+      <p:sp>
+        <p:nvSpPr>
+          <p:cNvPr id="36" name="Прямоугольник 35"/>
+          <p:cNvSpPr/>
+          <p:nvPr/>
+        </p:nvSpPr>
+        <p:spPr>
+          <a:xfrm>
+            <a:off x="8939789" y="3762246"/>
+            <a:ext cx="606429" cy="360219"/>
+          </a:xfrm>
+          <a:prstGeom prst="rect">
+            <a:avLst/>
+          </a:prstGeom>
+        </p:spPr>
+        <p:style>
+          <a:lnRef idx="2">
+            <a:schemeClr val="accent1">
+              <a:shade val="50000"/>
+            </a:schemeClr>
+          </a:lnRef>
+          <a:fillRef idx="1">
+            <a:schemeClr val="accent1"/>
+          </a:fillRef>
+          <a:effectRef idx="0">
+            <a:schemeClr val="accent1"/>
+          </a:effectRef>
+          <a:fontRef idx="minor">
+            <a:schemeClr val="lt1"/>
+          </a:fontRef>
+        </p:style>
+        <p:txBody>
+          <a:bodyPr rtlCol="0" anchor="ctr"/>
+          <a:lstStyle/>
+          <a:p>
+            <a:pPr algn="ctr"/>
+            <a:r>
+              <a:rPr lang="en-US" dirty="0" smtClean="0"/>
+              <a:t>Post</a:t>
+            </a:r>
+            <a:endParaRPr lang="ru-RU" dirty="0"/>
+          </a:p>
+        </p:txBody>
+      </p:sp>
+      <p:cxnSp>
+        <p:nvCxnSpPr>
+          <p:cNvPr id="41" name="Прямая со стрелкой 40"/>
+          <p:cNvCxnSpPr>
+            <a:stCxn id="32" idx="2"/>
+            <a:endCxn id="36" idx="0"/>
+          </p:cNvCxnSpPr>
+          <p:nvPr/>
+        </p:nvCxnSpPr>
+        <p:spPr>
+          <a:xfrm>
+            <a:off x="9243004" y="3443774"/>
+            <a:ext cx="0" cy="318472"/>
+          </a:xfrm>
+          <a:prstGeom prst="straightConnector1">
+            <a:avLst/>
+          </a:prstGeom>
+          <a:ln>
+            <a:tailEnd type="triangle"/>
+          </a:ln>
+        </p:spPr>
+        <p:style>
+          <a:lnRef idx="3">
+            <a:schemeClr val="accent6"/>
+          </a:lnRef>
+          <a:fillRef idx="0">
+            <a:schemeClr val="accent6"/>
+          </a:fillRef>
+          <a:effectRef idx="2">
+            <a:schemeClr val="accent6"/>
+          </a:effectRef>
+          <a:fontRef idx="minor">
+            <a:schemeClr val="tx1"/>
+          </a:fontRef>
+        </p:style>
+      </p:cxnSp>
+      <p:cxnSp>
+        <p:nvCxnSpPr>
+          <p:cNvPr id="7" name="Соединительная линия уступом 6"/>
+          <p:cNvCxnSpPr>
+            <a:stCxn id="28" idx="1"/>
+            <a:endCxn id="32" idx="0"/>
+          </p:cNvCxnSpPr>
+          <p:nvPr/>
+        </p:nvCxnSpPr>
+        <p:spPr>
+          <a:xfrm rot="10800000" flipV="1">
+            <a:off x="9243004" y="2618916"/>
+            <a:ext cx="497178" cy="483111"/>
+          </a:xfrm>
+          <a:prstGeom prst="bentConnector2">
+            <a:avLst/>
+          </a:prstGeom>
+          <a:ln>
+            <a:tailEnd type="triangle"/>
+          </a:ln>
+        </p:spPr>
+        <p:style>
+          <a:lnRef idx="3">
+            <a:schemeClr val="accent6"/>
+          </a:lnRef>
+          <a:fillRef idx="0">
+            <a:schemeClr val="accent6"/>
+          </a:fillRef>
+          <a:effectRef idx="2">
+            <a:schemeClr val="accent6"/>
+          </a:effectRef>
+          <a:fontRef idx="minor">
+            <a:schemeClr val="tx1"/>
+          </a:fontRef>
+        </p:style>
+      </p:cxnSp>
+      <p:sp>
+        <p:nvSpPr>
+          <p:cNvPr id="11" name="Прямоугольник 10"/>
+          <p:cNvSpPr/>
+          <p:nvPr/>
+        </p:nvSpPr>
+        <p:spPr>
+          <a:xfrm>
+            <a:off x="10621916" y="3113203"/>
+            <a:ext cx="1163782" cy="341747"/>
+          </a:xfrm>
+          <a:prstGeom prst="rect">
+            <a:avLst/>
+          </a:prstGeom>
+        </p:spPr>
+        <p:style>
+          <a:lnRef idx="2">
+            <a:schemeClr val="accent1">
+              <a:shade val="50000"/>
+            </a:schemeClr>
+          </a:lnRef>
+          <a:fillRef idx="1">
+            <a:schemeClr val="accent1"/>
+          </a:fillRef>
+          <a:effectRef idx="0">
+            <a:schemeClr val="accent1"/>
+          </a:effectRef>
+          <a:fontRef idx="minor">
+            <a:schemeClr val="lt1"/>
+          </a:fontRef>
+        </p:style>
+        <p:txBody>
+          <a:bodyPr rtlCol="0" anchor="ctr"/>
+          <a:lstStyle/>
+          <a:p>
+            <a:pPr algn="ctr"/>
+            <a:r>
+              <a:rPr lang="en-US" dirty="0" err="1" smtClean="0"/>
+              <a:t>ProfileInfo</a:t>
+            </a:r>
+            <a:endParaRPr lang="en-US" dirty="0"/>
+          </a:p>
+        </p:txBody>
+      </p:sp>
+      <p:cxnSp>
+        <p:nvCxnSpPr>
+          <p:cNvPr id="14" name="Соединительная линия уступом 13"/>
+          <p:cNvCxnSpPr>
+            <a:stCxn id="28" idx="3"/>
+          </p:cNvCxnSpPr>
+          <p:nvPr/>
+        </p:nvCxnSpPr>
+        <p:spPr>
+          <a:xfrm>
+            <a:off x="10621916" y="2618917"/>
+            <a:ext cx="581891" cy="494286"/>
+          </a:xfrm>
+          <a:prstGeom prst="bentConnector2">
+            <a:avLst/>
+          </a:prstGeom>
+          <a:ln>
+            <a:tailEnd type="triangle"/>
+          </a:ln>
+        </p:spPr>
+        <p:style>
+          <a:lnRef idx="3">
+            <a:schemeClr val="accent6"/>
+          </a:lnRef>
+          <a:fillRef idx="0">
+            <a:schemeClr val="accent6"/>
+          </a:fillRef>
+          <a:effectRef idx="2">
+            <a:schemeClr val="accent6"/>
+          </a:effectRef>
+          <a:fontRef idx="minor">
+            <a:schemeClr val="tx1"/>
+          </a:fontRef>
+        </p:style>
+      </p:cxnSp>
+      <p:sp>
+        <p:nvSpPr>
+          <p:cNvPr id="56" name="Прямоугольник 55"/>
+          <p:cNvSpPr/>
+          <p:nvPr/>
+        </p:nvSpPr>
+        <p:spPr>
+          <a:xfrm>
+            <a:off x="6411645" y="2438114"/>
+            <a:ext cx="861730" cy="378691"/>
+          </a:xfrm>
+          <a:prstGeom prst="rect">
+            <a:avLst/>
+          </a:prstGeom>
+        </p:spPr>
+        <p:style>
+          <a:lnRef idx="2">
+            <a:schemeClr val="accent1">
+              <a:shade val="50000"/>
+            </a:schemeClr>
+          </a:lnRef>
+          <a:fillRef idx="1">
+            <a:schemeClr val="accent1"/>
+          </a:fillRef>
+          <a:effectRef idx="0">
+            <a:schemeClr val="accent1"/>
+          </a:effectRef>
+          <a:fontRef idx="minor">
+            <a:schemeClr val="lt1"/>
+          </a:fontRef>
+        </p:style>
+        <p:txBody>
+          <a:bodyPr rtlCol="0" anchor="ctr"/>
+          <a:lstStyle/>
+          <a:p>
+            <a:pPr algn="ctr"/>
+            <a:r>
+              <a:rPr lang="en-US" dirty="0" smtClean="0"/>
+              <a:t>Dialogs</a:t>
+            </a:r>
+            <a:endParaRPr lang="ru-RU" dirty="0"/>
+          </a:p>
+        </p:txBody>
+      </p:sp>
+      <p:cxnSp>
+        <p:nvCxnSpPr>
+          <p:cNvPr id="58" name="Соединительная линия уступом 57"/>
+          <p:cNvCxnSpPr>
+            <a:stCxn id="8" idx="3"/>
+            <a:endCxn id="56" idx="0"/>
+          </p:cNvCxnSpPr>
+          <p:nvPr/>
+        </p:nvCxnSpPr>
+        <p:spPr>
+          <a:xfrm>
+            <a:off x="5422722" y="1137513"/>
+            <a:ext cx="1419788" cy="1300601"/>
+          </a:xfrm>
+          <a:prstGeom prst="bentConnector2">
+            <a:avLst/>
+          </a:prstGeom>
+          <a:ln>
+            <a:tailEnd type="triangle"/>
+          </a:ln>
+        </p:spPr>
+        <p:style>
+          <a:lnRef idx="3">
+            <a:schemeClr val="accent6"/>
+          </a:lnRef>
+          <a:fillRef idx="0">
+            <a:schemeClr val="accent6"/>
+          </a:fillRef>
+          <a:effectRef idx="2">
+            <a:schemeClr val="accent6"/>
+          </a:effectRef>
+          <a:fontRef idx="minor">
+            <a:schemeClr val="tx1"/>
+          </a:fontRef>
+        </p:style>
+      </p:cxnSp>
+      <p:cxnSp>
+        <p:nvCxnSpPr>
+          <p:cNvPr id="20" name="Соединительная линия уступом 19"/>
+          <p:cNvCxnSpPr>
+            <a:stCxn id="8" idx="2"/>
+            <a:endCxn id="18" idx="3"/>
+          </p:cNvCxnSpPr>
+          <p:nvPr/>
+        </p:nvCxnSpPr>
+        <p:spPr>
+          <a:xfrm rot="5400000">
+            <a:off x="3967936" y="1567066"/>
+            <a:ext cx="1300602" cy="820186"/>
+          </a:xfrm>
+          <a:prstGeom prst="bentConnector2">
+            <a:avLst/>
+          </a:prstGeom>
+          <a:ln>
+            <a:tailEnd type="triangle"/>
+          </a:ln>
+        </p:spPr>
+        <p:style>
+          <a:lnRef idx="3">
+            <a:schemeClr val="accent6"/>
+          </a:lnRef>
+          <a:fillRef idx="0">
+            <a:schemeClr val="accent6"/>
+          </a:fillRef>
+          <a:effectRef idx="2">
+            <a:schemeClr val="accent6"/>
+          </a:effectRef>
+          <a:fontRef idx="minor">
+            <a:schemeClr val="tx1"/>
+          </a:fontRef>
+        </p:style>
+      </p:cxnSp>
+      <p:sp>
+        <p:nvSpPr>
+          <p:cNvPr id="23" name="Прямоугольник 22"/>
+          <p:cNvSpPr/>
+          <p:nvPr/>
+        </p:nvSpPr>
+        <p:spPr>
+          <a:xfrm>
+            <a:off x="5334799" y="3113203"/>
+            <a:ext cx="1310054" cy="274218"/>
+          </a:xfrm>
+          <a:prstGeom prst="rect">
+            <a:avLst/>
+          </a:prstGeom>
+        </p:spPr>
+        <p:style>
+          <a:lnRef idx="2">
+            <a:schemeClr val="accent1">
+              <a:shade val="50000"/>
+            </a:schemeClr>
+          </a:lnRef>
+          <a:fillRef idx="1">
+            <a:schemeClr val="accent1"/>
+          </a:fillRef>
+          <a:effectRef idx="0">
+            <a:schemeClr val="accent1"/>
+          </a:effectRef>
+          <a:fontRef idx="minor">
+            <a:schemeClr val="lt1"/>
+          </a:fontRef>
+        </p:style>
+        <p:txBody>
+          <a:bodyPr rtlCol="0" anchor="ctr"/>
+          <a:lstStyle/>
+          <a:p>
+            <a:pPr algn="ctr"/>
+            <a:r>
+              <a:rPr lang="en-US" dirty="0" err="1" smtClean="0"/>
+              <a:t>DialogsItem</a:t>
+            </a:r>
+            <a:endParaRPr lang="ru-RU" dirty="0"/>
+          </a:p>
+        </p:txBody>
+      </p:sp>
+      <p:sp>
+        <p:nvSpPr>
+          <p:cNvPr id="24" name="Прямоугольник 23"/>
+          <p:cNvSpPr/>
+          <p:nvPr/>
+        </p:nvSpPr>
+        <p:spPr>
+          <a:xfrm>
+            <a:off x="6842511" y="3113203"/>
+            <a:ext cx="1677236" cy="274218"/>
+          </a:xfrm>
+          <a:prstGeom prst="rect">
+            <a:avLst/>
+          </a:prstGeom>
+        </p:spPr>
+        <p:style>
+          <a:lnRef idx="2">
+            <a:schemeClr val="accent1">
+              <a:shade val="50000"/>
+            </a:schemeClr>
+          </a:lnRef>
+          <a:fillRef idx="1">
+            <a:schemeClr val="accent1"/>
+          </a:fillRef>
+          <a:effectRef idx="0">
+            <a:schemeClr val="accent1"/>
+          </a:effectRef>
+          <a:fontRef idx="minor">
+            <a:schemeClr val="lt1"/>
+          </a:fontRef>
+        </p:style>
+        <p:txBody>
+          <a:bodyPr rtlCol="0" anchor="ctr"/>
+          <a:lstStyle/>
+          <a:p>
+            <a:pPr algn="ctr"/>
+            <a:r>
+              <a:rPr lang="en-US" dirty="0" err="1" smtClean="0"/>
+              <a:t>DialogMessages</a:t>
+            </a:r>
+            <a:endParaRPr lang="ru-RU" dirty="0"/>
+          </a:p>
+        </p:txBody>
+      </p:sp>
+      <p:cxnSp>
+        <p:nvCxnSpPr>
+          <p:cNvPr id="27" name="Соединительная линия уступом 26"/>
+          <p:cNvCxnSpPr>
+            <a:stCxn id="56" idx="2"/>
+            <a:endCxn id="24" idx="0"/>
+          </p:cNvCxnSpPr>
+          <p:nvPr/>
+        </p:nvCxnSpPr>
+        <p:spPr>
+          <a:xfrm rot="16200000" flipH="1">
+            <a:off x="7113620" y="2545694"/>
+            <a:ext cx="296398" cy="838619"/>
+          </a:xfrm>
+          <a:prstGeom prst="bentConnector3">
+            <a:avLst/>
+          </a:prstGeom>
+          <a:ln>
+            <a:tailEnd type="triangle"/>
+          </a:ln>
+        </p:spPr>
+        <p:style>
+          <a:lnRef idx="3">
+            <a:schemeClr val="accent6"/>
+          </a:lnRef>
+          <a:fillRef idx="0">
+            <a:schemeClr val="accent6"/>
+          </a:fillRef>
+          <a:effectRef idx="2">
+            <a:schemeClr val="accent6"/>
+          </a:effectRef>
+          <a:fontRef idx="minor">
+            <a:schemeClr val="tx1"/>
+          </a:fontRef>
+        </p:style>
+      </p:cxnSp>
+      <p:cxnSp>
+        <p:nvCxnSpPr>
+          <p:cNvPr id="31" name="Соединительная линия уступом 30"/>
+          <p:cNvCxnSpPr>
+            <a:stCxn id="56" idx="1"/>
+            <a:endCxn id="23" idx="0"/>
+          </p:cNvCxnSpPr>
+          <p:nvPr/>
+        </p:nvCxnSpPr>
+        <p:spPr>
+          <a:xfrm rot="10800000" flipV="1">
+            <a:off x="5989827" y="2627459"/>
+            <a:ext cx="421819" cy="485743"/>
+          </a:xfrm>
+          <a:prstGeom prst="bentConnector2">
+            <a:avLst/>
+          </a:prstGeom>
+          <a:ln>
+            <a:tailEnd type="triangle"/>
+          </a:ln>
+        </p:spPr>
+        <p:style>
+          <a:lnRef idx="3">
+            <a:schemeClr val="accent6"/>
+          </a:lnRef>
+          <a:fillRef idx="0">
+            <a:schemeClr val="accent6"/>
+          </a:fillRef>
+          <a:effectRef idx="2">
+            <a:schemeClr val="accent6"/>
+          </a:effectRef>
+          <a:fontRef idx="minor">
+            <a:schemeClr val="tx1"/>
+          </a:fontRef>
+        </p:style>
+      </p:cxnSp>
+      <p:sp>
+        <p:nvSpPr>
+          <p:cNvPr id="51" name="Прямоугольник 50"/>
+          <p:cNvSpPr/>
+          <p:nvPr/>
+        </p:nvSpPr>
+        <p:spPr>
+          <a:xfrm>
+            <a:off x="163248" y="758856"/>
+            <a:ext cx="1253722" cy="207284"/>
+          </a:xfrm>
+          <a:prstGeom prst="rect">
+            <a:avLst/>
+          </a:prstGeom>
+        </p:spPr>
+        <p:style>
+          <a:lnRef idx="2">
+            <a:schemeClr val="accent1">
+              <a:shade val="50000"/>
+            </a:schemeClr>
+          </a:lnRef>
+          <a:fillRef idx="1">
+            <a:schemeClr val="accent1"/>
+          </a:fillRef>
+          <a:effectRef idx="0">
+            <a:schemeClr val="accent1"/>
+          </a:effectRef>
+          <a:fontRef idx="minor">
+            <a:schemeClr val="lt1"/>
+          </a:fontRef>
+        </p:style>
+        <p:txBody>
+          <a:bodyPr rtlCol="0" anchor="ctr"/>
+          <a:lstStyle/>
+          <a:p>
+            <a:pPr algn="ctr"/>
+            <a:r>
+              <a:rPr lang="en-US" sz="1200" dirty="0" smtClean="0"/>
+              <a:t>[</a:t>
+            </a:r>
+            <a:r>
+              <a:rPr lang="en-US" sz="1200" dirty="0" err="1" smtClean="0"/>
+              <a:t>messagesData</a:t>
+            </a:r>
+            <a:r>
+              <a:rPr lang="en-US" sz="1200" dirty="0" smtClean="0"/>
+              <a:t>]</a:t>
+            </a:r>
+            <a:endParaRPr lang="ru-RU" sz="1200" dirty="0"/>
+          </a:p>
+        </p:txBody>
+      </p:sp>
+      <p:sp>
+        <p:nvSpPr>
+          <p:cNvPr id="55" name="Прямоугольник 54"/>
+          <p:cNvSpPr/>
+          <p:nvPr/>
+        </p:nvSpPr>
+        <p:spPr>
+          <a:xfrm>
+            <a:off x="1504717" y="746490"/>
+            <a:ext cx="930752" cy="207285"/>
+          </a:xfrm>
+          <a:prstGeom prst="rect">
+            <a:avLst/>
+          </a:prstGeom>
+        </p:spPr>
+        <p:style>
+          <a:lnRef idx="2">
+            <a:schemeClr val="accent1">
+              <a:shade val="50000"/>
+            </a:schemeClr>
+          </a:lnRef>
+          <a:fillRef idx="1">
+            <a:schemeClr val="accent1"/>
+          </a:fillRef>
+          <a:effectRef idx="0">
+            <a:schemeClr val="accent1"/>
+          </a:effectRef>
+          <a:fontRef idx="minor">
+            <a:schemeClr val="lt1"/>
+          </a:fontRef>
+        </p:style>
+        <p:txBody>
+          <a:bodyPr rtlCol="0" anchor="ctr"/>
+          <a:lstStyle/>
+          <a:p>
+            <a:pPr algn="ctr"/>
+            <a:r>
+              <a:rPr lang="en-US" sz="1200" dirty="0" err="1" smtClean="0"/>
+              <a:t>dialogsData</a:t>
+            </a:r>
+            <a:endParaRPr lang="ru-RU" sz="1200" dirty="0"/>
+          </a:p>
+        </p:txBody>
+      </p:sp>
+      <p:cxnSp>
+        <p:nvCxnSpPr>
+          <p:cNvPr id="59" name="Прямая со стрелкой 58"/>
+          <p:cNvCxnSpPr>
+            <a:stCxn id="4" idx="2"/>
+            <a:endCxn id="55" idx="0"/>
+          </p:cNvCxnSpPr>
+          <p:nvPr/>
+        </p:nvCxnSpPr>
+        <p:spPr>
+          <a:xfrm>
+            <a:off x="1447135" y="434017"/>
+            <a:ext cx="522958" cy="312473"/>
+          </a:xfrm>
+          <a:prstGeom prst="straightConnector1">
+            <a:avLst/>
+          </a:prstGeom>
+          <a:ln>
+            <a:tailEnd type="triangle"/>
+          </a:ln>
+        </p:spPr>
+        <p:style>
+          <a:lnRef idx="3">
+            <a:schemeClr val="accent6"/>
+          </a:lnRef>
+          <a:fillRef idx="0">
+            <a:schemeClr val="accent6"/>
+          </a:fillRef>
+          <a:effectRef idx="2">
+            <a:schemeClr val="accent6"/>
+          </a:effectRef>
+          <a:fontRef idx="minor">
+            <a:schemeClr val="tx1"/>
+          </a:fontRef>
+        </p:style>
+      </p:cxnSp>
+      <p:cxnSp>
+        <p:nvCxnSpPr>
+          <p:cNvPr id="61" name="Прямая со стрелкой 60"/>
+          <p:cNvCxnSpPr>
+            <a:stCxn id="4" idx="2"/>
+            <a:endCxn id="51" idx="0"/>
+          </p:cNvCxnSpPr>
+          <p:nvPr/>
+        </p:nvCxnSpPr>
+        <p:spPr>
+          <a:xfrm flipH="1">
+            <a:off x="790109" y="434017"/>
+            <a:ext cx="657026" cy="324839"/>
+          </a:xfrm>
+          <a:prstGeom prst="straightConnector1">
+            <a:avLst/>
+          </a:prstGeom>
+          <a:ln>
+            <a:tailEnd type="triangle"/>
+          </a:ln>
+        </p:spPr>
+        <p:style>
+          <a:lnRef idx="3">
+            <a:schemeClr val="accent6"/>
+          </a:lnRef>
+          <a:fillRef idx="0">
+            <a:schemeClr val="accent6"/>
+          </a:fillRef>
+          <a:effectRef idx="2">
+            <a:schemeClr val="accent6"/>
+          </a:effectRef>
+          <a:fontRef idx="minor">
+            <a:schemeClr val="tx1"/>
+          </a:fontRef>
+        </p:style>
+      </p:cxnSp>
+      <p:cxnSp>
+        <p:nvCxnSpPr>
+          <p:cNvPr id="68" name="Соединительная линия уступом 67"/>
+          <p:cNvCxnSpPr>
+            <a:stCxn id="55" idx="3"/>
+            <a:endCxn id="8" idx="0"/>
+          </p:cNvCxnSpPr>
+          <p:nvPr/>
+        </p:nvCxnSpPr>
+        <p:spPr>
+          <a:xfrm>
+            <a:off x="2435469" y="850133"/>
+            <a:ext cx="2592861" cy="98034"/>
+          </a:xfrm>
+          <a:prstGeom prst="bentConnector2">
+            <a:avLst/>
+          </a:prstGeom>
+          <a:ln>
+            <a:tailEnd type="triangle"/>
+          </a:ln>
+        </p:spPr>
+        <p:style>
+          <a:lnRef idx="3">
+            <a:schemeClr val="accent2"/>
+          </a:lnRef>
+          <a:fillRef idx="0">
+            <a:schemeClr val="accent2"/>
+          </a:fillRef>
+          <a:effectRef idx="2">
+            <a:schemeClr val="accent2"/>
+          </a:effectRef>
+          <a:fontRef idx="minor">
+            <a:schemeClr val="tx1"/>
+          </a:fontRef>
+        </p:style>
+      </p:cxnSp>
+      <p:cxnSp>
+        <p:nvCxnSpPr>
+          <p:cNvPr id="74" name="Соединительная линия уступом 73"/>
+          <p:cNvCxnSpPr/>
+          <p:nvPr/>
+        </p:nvCxnSpPr>
+        <p:spPr>
+          <a:xfrm rot="16200000" flipH="1">
+            <a:off x="5411458" y="1312403"/>
+            <a:ext cx="1122195" cy="1099669"/>
+          </a:xfrm>
+          <a:prstGeom prst="bentConnector3">
+            <a:avLst>
+              <a:gd name="adj1" fmla="val 50000"/>
+            </a:avLst>
+          </a:prstGeom>
+          <a:ln>
+            <a:tailEnd type="triangle"/>
+          </a:ln>
+        </p:spPr>
+        <p:style>
+          <a:lnRef idx="3">
+            <a:schemeClr val="accent2"/>
+          </a:lnRef>
+          <a:fillRef idx="0">
+            <a:schemeClr val="accent2"/>
+          </a:fillRef>
+          <a:effectRef idx="2">
+            <a:schemeClr val="accent2"/>
+          </a:effectRef>
+          <a:fontRef idx="minor">
+            <a:schemeClr val="tx1"/>
+          </a:fontRef>
+        </p:style>
+      </p:cxnSp>
     </p:spTree>
     <p:extLst>
       <p:ext uri="{BB962C8B-B14F-4D97-AF65-F5344CB8AC3E}">
-        <p14:creationId xmlns:p14="http://schemas.microsoft.com/office/powerpoint/2010/main" val="3592661769"/>
+        <p14:creationId xmlns:p14="http://schemas.microsoft.com/office/powerpoint/2010/main" val="3123048679"/>
       </p:ext>
     </p:extLst>
   </p:cSld>
   <p:clrMapOvr>
     <a:masterClrMapping/>
   </p:clrMapOvr>
+  <p:timing>
+    <p:tnLst>
+      <p:par>
+        <p:cTn id="1" dur="indefinite" restart="never" nodeType="tmRoot"/>
+      </p:par>
+    </p:tnLst>
+  </p:timing>
 </p:sld>
 </file>
 

</xml_diff>

<commit_message>
move data array postsData to index.js
</commit_message>
<xml_diff>
--- a/nesting map.pptx
+++ b/nesting map.pptx
@@ -5,8 +5,7 @@
     <p:sldMasterId id="2147483648" r:id="rId1"/>
   </p:sldMasterIdLst>
   <p:sldIdLst>
-    <p:sldId id="256" r:id="rId2"/>
-    <p:sldId id="257" r:id="rId3"/>
+    <p:sldId id="257" r:id="rId2"/>
   </p:sldIdLst>
   <p:sldSz cx="12192000" cy="6858000"/>
   <p:notesSz cx="6858000" cy="9144000"/>
@@ -2970,36 +2969,6 @@
           <a:chExt cx="0" cy="0"/>
         </a:xfrm>
       </p:grpSpPr>
-    </p:spTree>
-    <p:extLst>
-      <p:ext uri="{BB962C8B-B14F-4D97-AF65-F5344CB8AC3E}">
-        <p14:creationId xmlns:p14="http://schemas.microsoft.com/office/powerpoint/2010/main" val="3592661769"/>
-      </p:ext>
-    </p:extLst>
-  </p:cSld>
-  <p:clrMapOvr>
-    <a:masterClrMapping/>
-  </p:clrMapOvr>
-</p:sld>
-</file>
-
-<file path=ppt/slides/slide2.xml><?xml version="1.0" encoding="utf-8"?>
-<p:sld xmlns:a="http://schemas.openxmlformats.org/drawingml/2006/main" xmlns:r="http://schemas.openxmlformats.org/officeDocument/2006/relationships" xmlns:p="http://schemas.openxmlformats.org/presentationml/2006/main">
-  <p:cSld>
-    <p:spTree>
-      <p:nvGrpSpPr>
-        <p:cNvPr id="1" name=""/>
-        <p:cNvGrpSpPr/>
-        <p:nvPr/>
-      </p:nvGrpSpPr>
-      <p:grpSpPr>
-        <a:xfrm>
-          <a:off x="0" y="0"/>
-          <a:ext cx="0" cy="0"/>
-          <a:chOff x="0" y="0"/>
-          <a:chExt cx="0" cy="0"/>
-        </a:xfrm>
-      </p:grpSpPr>
       <p:sp>
         <p:nvSpPr>
           <p:cNvPr id="4" name="Прямоугольник 3"/>
@@ -3261,17 +3230,18 @@
           <p:cNvPr id="34" name="Соединительная линия уступом 33"/>
           <p:cNvCxnSpPr>
             <a:stCxn id="8" idx="3"/>
-            <a:endCxn id="28" idx="0"/>
           </p:cNvCxnSpPr>
           <p:nvPr/>
         </p:nvCxnSpPr>
         <p:spPr>
           <a:xfrm>
             <a:off x="5422722" y="1137513"/>
-            <a:ext cx="4758327" cy="1285824"/>
-          </a:xfrm>
-          <a:prstGeom prst="bentConnector2">
-            <a:avLst/>
+            <a:ext cx="4317460" cy="1360819"/>
+          </a:xfrm>
+          <a:prstGeom prst="bentConnector3">
+            <a:avLst>
+              <a:gd name="adj1" fmla="val 50000"/>
+            </a:avLst>
           </a:prstGeom>
           <a:ln>
             <a:tailEnd type="triangle"/>
@@ -4014,16 +3984,13 @@
       <p:cxnSp>
         <p:nvCxnSpPr>
           <p:cNvPr id="68" name="Соединительная линия уступом 67"/>
-          <p:cNvCxnSpPr>
-            <a:stCxn id="55" idx="3"/>
-            <a:endCxn id="8" idx="0"/>
-          </p:cNvCxnSpPr>
+          <p:cNvCxnSpPr/>
           <p:nvPr/>
         </p:nvCxnSpPr>
         <p:spPr>
-          <a:xfrm>
-            <a:off x="2435469" y="850133"/>
-            <a:ext cx="2592861" cy="98034"/>
+          <a:xfrm rot="16200000" flipH="1">
+            <a:off x="3311373" y="-290140"/>
+            <a:ext cx="87185" cy="2557945"/>
           </a:xfrm>
           <a:prstGeom prst="bentConnector2">
             <a:avLst/>
@@ -4076,6 +4043,159 @@
           </a:fillRef>
           <a:effectRef idx="2">
             <a:schemeClr val="accent2"/>
+          </a:effectRef>
+          <a:fontRef idx="minor">
+            <a:schemeClr val="tx1"/>
+          </a:fontRef>
+        </p:style>
+      </p:cxnSp>
+      <p:sp>
+        <p:nvSpPr>
+          <p:cNvPr id="2" name="Прямоугольник 1"/>
+          <p:cNvSpPr/>
+          <p:nvPr/>
+        </p:nvSpPr>
+        <p:spPr>
+          <a:xfrm>
+            <a:off x="2558469" y="749668"/>
+            <a:ext cx="861740" cy="191109"/>
+          </a:xfrm>
+          <a:prstGeom prst="rect">
+            <a:avLst/>
+          </a:prstGeom>
+        </p:spPr>
+        <p:style>
+          <a:lnRef idx="2">
+            <a:schemeClr val="accent1">
+              <a:shade val="50000"/>
+            </a:schemeClr>
+          </a:lnRef>
+          <a:fillRef idx="1">
+            <a:schemeClr val="accent1"/>
+          </a:fillRef>
+          <a:effectRef idx="0">
+            <a:schemeClr val="accent1"/>
+          </a:effectRef>
+          <a:fontRef idx="minor">
+            <a:schemeClr val="lt1"/>
+          </a:fontRef>
+        </p:style>
+        <p:txBody>
+          <a:bodyPr rtlCol="0" anchor="ctr"/>
+          <a:lstStyle/>
+          <a:p>
+            <a:pPr algn="ctr"/>
+            <a:r>
+              <a:rPr lang="en-US" sz="1200" dirty="0" err="1" smtClean="0"/>
+              <a:t>postsData</a:t>
+            </a:r>
+            <a:endParaRPr lang="ru-RU" sz="1200" dirty="0"/>
+          </a:p>
+        </p:txBody>
+      </p:sp>
+      <p:cxnSp>
+        <p:nvCxnSpPr>
+          <p:cNvPr id="9" name="Соединительная линия уступом 8"/>
+          <p:cNvCxnSpPr>
+            <a:stCxn id="2" idx="2"/>
+          </p:cNvCxnSpPr>
+          <p:nvPr/>
+        </p:nvCxnSpPr>
+        <p:spPr>
+          <a:xfrm rot="16200000" flipH="1">
+            <a:off x="3622231" y="307885"/>
+            <a:ext cx="360363" cy="1626146"/>
+          </a:xfrm>
+          <a:prstGeom prst="bentConnector2">
+            <a:avLst/>
+          </a:prstGeom>
+          <a:ln>
+            <a:tailEnd type="triangle"/>
+          </a:ln>
+        </p:spPr>
+        <p:style>
+          <a:lnRef idx="3">
+            <a:schemeClr val="accent4"/>
+          </a:lnRef>
+          <a:fillRef idx="0">
+            <a:schemeClr val="accent4"/>
+          </a:fillRef>
+          <a:effectRef idx="2">
+            <a:schemeClr val="accent4"/>
+          </a:effectRef>
+          <a:fontRef idx="minor">
+            <a:schemeClr val="tx1"/>
+          </a:fontRef>
+        </p:style>
+      </p:cxnSp>
+      <p:cxnSp>
+        <p:nvCxnSpPr>
+          <p:cNvPr id="15" name="Соединительная линия уступом 14"/>
+          <p:cNvCxnSpPr>
+            <a:stCxn id="8" idx="0"/>
+            <a:endCxn id="28" idx="0"/>
+          </p:cNvCxnSpPr>
+          <p:nvPr/>
+        </p:nvCxnSpPr>
+        <p:spPr>
+          <a:xfrm rot="16200000" flipH="1">
+            <a:off x="6867104" y="-890607"/>
+            <a:ext cx="1475170" cy="5152719"/>
+          </a:xfrm>
+          <a:prstGeom prst="bentConnector3">
+            <a:avLst>
+              <a:gd name="adj1" fmla="val -15497"/>
+            </a:avLst>
+          </a:prstGeom>
+          <a:ln>
+            <a:tailEnd type="triangle"/>
+          </a:ln>
+        </p:spPr>
+        <p:style>
+          <a:lnRef idx="3">
+            <a:schemeClr val="accent4"/>
+          </a:lnRef>
+          <a:fillRef idx="0">
+            <a:schemeClr val="accent4"/>
+          </a:fillRef>
+          <a:effectRef idx="2">
+            <a:schemeClr val="accent4"/>
+          </a:effectRef>
+          <a:fontRef idx="minor">
+            <a:schemeClr val="tx1"/>
+          </a:fontRef>
+        </p:style>
+      </p:cxnSp>
+      <p:cxnSp>
+        <p:nvCxnSpPr>
+          <p:cNvPr id="35" name="Соединительная линия уступом 34"/>
+          <p:cNvCxnSpPr>
+            <a:stCxn id="28" idx="2"/>
+            <a:endCxn id="32" idx="3"/>
+          </p:cNvCxnSpPr>
+          <p:nvPr/>
+        </p:nvCxnSpPr>
+        <p:spPr>
+          <a:xfrm rot="5400000">
+            <a:off x="9731414" y="2823266"/>
+            <a:ext cx="458404" cy="440867"/>
+          </a:xfrm>
+          <a:prstGeom prst="bentConnector2">
+            <a:avLst/>
+          </a:prstGeom>
+          <a:ln>
+            <a:tailEnd type="triangle"/>
+          </a:ln>
+        </p:spPr>
+        <p:style>
+          <a:lnRef idx="3">
+            <a:schemeClr val="accent4"/>
+          </a:lnRef>
+          <a:fillRef idx="0">
+            <a:schemeClr val="accent4"/>
+          </a:fillRef>
+          <a:effectRef idx="2">
+            <a:schemeClr val="accent4"/>
           </a:effectRef>
           <a:fontRef idx="minor">
             <a:schemeClr val="tx1"/>

</xml_diff>